<commit_message>
Added watermark to presentation
</commit_message>
<xml_diff>
--- a/KonradStepniak/Testy jednostkowe Konrad Stępniak.pptx
+++ b/KonradStepniak/Testy jednostkowe Konrad Stępniak.pptx
@@ -4462,7 +4462,7 @@
           <a:p>
             <a:fld id="{BFC0EC73-D7A7-4532-88F3-B222CBA1DBF1}" type="datetimeFigureOut">
               <a:rPr lang="pl-PL" smtClean="0"/>
-              <a:t>09.12.2022</a:t>
+              <a:t>13.01.2023</a:t>
             </a:fld>
             <a:endParaRPr lang="pl-PL"/>
           </a:p>
@@ -4713,7 +4713,7 @@
           <a:p>
             <a:fld id="{BFC0EC73-D7A7-4532-88F3-B222CBA1DBF1}" type="datetimeFigureOut">
               <a:rPr lang="pl-PL" smtClean="0"/>
-              <a:t>09.12.2022</a:t>
+              <a:t>13.01.2023</a:t>
             </a:fld>
             <a:endParaRPr lang="pl-PL"/>
           </a:p>
@@ -5027,7 +5027,7 @@
           <a:p>
             <a:fld id="{BFC0EC73-D7A7-4532-88F3-B222CBA1DBF1}" type="datetimeFigureOut">
               <a:rPr lang="pl-PL" smtClean="0"/>
-              <a:t>09.12.2022</a:t>
+              <a:t>13.01.2023</a:t>
             </a:fld>
             <a:endParaRPr lang="pl-PL"/>
           </a:p>
@@ -5368,7 +5368,7 @@
           <a:p>
             <a:fld id="{BFC0EC73-D7A7-4532-88F3-B222CBA1DBF1}" type="datetimeFigureOut">
               <a:rPr lang="pl-PL" smtClean="0"/>
-              <a:t>09.12.2022</a:t>
+              <a:t>13.01.2023</a:t>
             </a:fld>
             <a:endParaRPr lang="pl-PL"/>
           </a:p>
@@ -5682,7 +5682,7 @@
           <a:p>
             <a:fld id="{BFC0EC73-D7A7-4532-88F3-B222CBA1DBF1}" type="datetimeFigureOut">
               <a:rPr lang="pl-PL" smtClean="0"/>
-              <a:t>09.12.2022</a:t>
+              <a:t>13.01.2023</a:t>
             </a:fld>
             <a:endParaRPr lang="pl-PL"/>
           </a:p>
@@ -6075,7 +6075,7 @@
           <a:p>
             <a:fld id="{BFC0EC73-D7A7-4532-88F3-B222CBA1DBF1}" type="datetimeFigureOut">
               <a:rPr lang="pl-PL" smtClean="0"/>
-              <a:t>09.12.2022</a:t>
+              <a:t>13.01.2023</a:t>
             </a:fld>
             <a:endParaRPr lang="pl-PL"/>
           </a:p>
@@ -6245,7 +6245,7 @@
           <a:p>
             <a:fld id="{BFC0EC73-D7A7-4532-88F3-B222CBA1DBF1}" type="datetimeFigureOut">
               <a:rPr lang="pl-PL" smtClean="0"/>
-              <a:t>09.12.2022</a:t>
+              <a:t>13.01.2023</a:t>
             </a:fld>
             <a:endParaRPr lang="pl-PL"/>
           </a:p>
@@ -6425,7 +6425,7 @@
           <a:p>
             <a:fld id="{BFC0EC73-D7A7-4532-88F3-B222CBA1DBF1}" type="datetimeFigureOut">
               <a:rPr lang="pl-PL" smtClean="0"/>
-              <a:t>09.12.2022</a:t>
+              <a:t>13.01.2023</a:t>
             </a:fld>
             <a:endParaRPr lang="pl-PL"/>
           </a:p>
@@ -6601,7 +6601,7 @@
           <a:p>
             <a:fld id="{BFC0EC73-D7A7-4532-88F3-B222CBA1DBF1}" type="datetimeFigureOut">
               <a:rPr lang="pl-PL" smtClean="0"/>
-              <a:t>09.12.2022</a:t>
+              <a:t>13.01.2023</a:t>
             </a:fld>
             <a:endParaRPr lang="pl-PL"/>
           </a:p>
@@ -6848,7 +6848,7 @@
           <a:p>
             <a:fld id="{BFC0EC73-D7A7-4532-88F3-B222CBA1DBF1}" type="datetimeFigureOut">
               <a:rPr lang="pl-PL" smtClean="0"/>
-              <a:t>09.12.2022</a:t>
+              <a:t>13.01.2023</a:t>
             </a:fld>
             <a:endParaRPr lang="pl-PL"/>
           </a:p>
@@ -7080,7 +7080,7 @@
           <a:p>
             <a:fld id="{BFC0EC73-D7A7-4532-88F3-B222CBA1DBF1}" type="datetimeFigureOut">
               <a:rPr lang="pl-PL" smtClean="0"/>
-              <a:t>09.12.2022</a:t>
+              <a:t>13.01.2023</a:t>
             </a:fld>
             <a:endParaRPr lang="pl-PL"/>
           </a:p>
@@ -7454,7 +7454,7 @@
           <a:p>
             <a:fld id="{BFC0EC73-D7A7-4532-88F3-B222CBA1DBF1}" type="datetimeFigureOut">
               <a:rPr lang="pl-PL" smtClean="0"/>
-              <a:t>09.12.2022</a:t>
+              <a:t>13.01.2023</a:t>
             </a:fld>
             <a:endParaRPr lang="pl-PL"/>
           </a:p>
@@ -7577,7 +7577,7 @@
           <a:p>
             <a:fld id="{BFC0EC73-D7A7-4532-88F3-B222CBA1DBF1}" type="datetimeFigureOut">
               <a:rPr lang="pl-PL" smtClean="0"/>
-              <a:t>09.12.2022</a:t>
+              <a:t>13.01.2023</a:t>
             </a:fld>
             <a:endParaRPr lang="pl-PL"/>
           </a:p>
@@ -7672,7 +7672,7 @@
           <a:p>
             <a:fld id="{BFC0EC73-D7A7-4532-88F3-B222CBA1DBF1}" type="datetimeFigureOut">
               <a:rPr lang="pl-PL" smtClean="0"/>
-              <a:t>09.12.2022</a:t>
+              <a:t>13.01.2023</a:t>
             </a:fld>
             <a:endParaRPr lang="pl-PL"/>
           </a:p>
@@ -7927,7 +7927,7 @@
           <a:p>
             <a:fld id="{BFC0EC73-D7A7-4532-88F3-B222CBA1DBF1}" type="datetimeFigureOut">
               <a:rPr lang="pl-PL" smtClean="0"/>
-              <a:t>09.12.2022</a:t>
+              <a:t>13.01.2023</a:t>
             </a:fld>
             <a:endParaRPr lang="pl-PL"/>
           </a:p>
@@ -8190,7 +8190,7 @@
           <a:p>
             <a:fld id="{BFC0EC73-D7A7-4532-88F3-B222CBA1DBF1}" type="datetimeFigureOut">
               <a:rPr lang="pl-PL" smtClean="0"/>
-              <a:t>09.12.2022</a:t>
+              <a:t>13.01.2023</a:t>
             </a:fld>
             <a:endParaRPr lang="pl-PL"/>
           </a:p>
@@ -8933,7 +8933,7 @@
           <a:p>
             <a:fld id="{BFC0EC73-D7A7-4532-88F3-B222CBA1DBF1}" type="datetimeFigureOut">
               <a:rPr lang="pl-PL" smtClean="0"/>
-              <a:t>09.12.2022</a:t>
+              <a:t>13.01.2023</a:t>
             </a:fld>
             <a:endParaRPr lang="pl-PL"/>
           </a:p>
@@ -10254,6 +10254,83 @@
           </a:fontRef>
         </p:style>
       </p:sp>
+      <p:pic>
+        <p:nvPicPr>
+          <p:cNvPr id="6" name="Obraz 4" descr="Obraz zawierający tekst&#10;&#10;Opis wygenerowany automatycznie">
+            <a:extLst>
+              <a:ext uri="{FF2B5EF4-FFF2-40B4-BE49-F238E27FC236}">
+                <a16:creationId xmlns:a16="http://schemas.microsoft.com/office/drawing/2014/main" id="{0AF6A6F2-DB8A-F106-D09D-EDFF21431188}"/>
+              </a:ext>
+            </a:extLst>
+          </p:cNvPr>
+          <p:cNvPicPr>
+            <a:picLocks noChangeAspect="1"/>
+          </p:cNvPicPr>
+          <p:nvPr/>
+        </p:nvPicPr>
+        <p:blipFill>
+          <a:blip r:embed="rId3">
+            <a:extLst>
+              <a:ext uri="{28A0092B-C50C-407E-A947-70E740481C1C}">
+                <a14:useLocalDpi xmlns:a14="http://schemas.microsoft.com/office/drawing/2010/main" val="0"/>
+              </a:ext>
+            </a:extLst>
+          </a:blip>
+          <a:stretch>
+            <a:fillRect/>
+          </a:stretch>
+        </p:blipFill>
+        <p:spPr>
+          <a:xfrm>
+            <a:off x="0" y="5888231"/>
+            <a:ext cx="2498893" cy="969769"/>
+          </a:xfrm>
+          <a:prstGeom prst="rect">
+            <a:avLst/>
+          </a:prstGeom>
+        </p:spPr>
+      </p:pic>
+      <p:sp>
+        <p:nvSpPr>
+          <p:cNvPr id="8" name="TextBox 7">
+            <a:extLst>
+              <a:ext uri="{FF2B5EF4-FFF2-40B4-BE49-F238E27FC236}">
+                <a16:creationId xmlns:a16="http://schemas.microsoft.com/office/drawing/2014/main" id="{90FCD1CC-5247-13E2-2078-3D721BCA9085}"/>
+              </a:ext>
+            </a:extLst>
+          </p:cNvPr>
+          <p:cNvSpPr txBox="1"/>
+          <p:nvPr/>
+        </p:nvSpPr>
+        <p:spPr>
+          <a:xfrm>
+            <a:off x="677335" y="2586213"/>
+            <a:ext cx="6128158" cy="276999"/>
+          </a:xfrm>
+          <a:prstGeom prst="rect">
+            <a:avLst/>
+          </a:prstGeom>
+          <a:noFill/>
+        </p:spPr>
+        <p:txBody>
+          <a:bodyPr wrap="square">
+            <a:spAutoFit/>
+          </a:bodyPr>
+          <a:lstStyle/>
+          <a:p>
+            <a:r>
+              <a:rPr lang="pl-PL" sz="1200" dirty="0">
+                <a:solidFill>
+                  <a:schemeClr val="bg2">
+                    <a:lumMod val="75000"/>
+                  </a:schemeClr>
+                </a:solidFill>
+              </a:rPr>
+              <a:t>Zaawansowane techniki programowania</a:t>
+            </a:r>
+          </a:p>
+        </p:txBody>
+      </p:sp>
     </p:spTree>
     <p:extLst>
       <p:ext uri="{BB962C8B-B14F-4D97-AF65-F5344CB8AC3E}">
@@ -10381,6 +10458,83 @@
           </a:prstGeom>
         </p:spPr>
       </p:pic>
+      <p:pic>
+        <p:nvPicPr>
+          <p:cNvPr id="4" name="Obraz 4" descr="Obraz zawierający tekst&#10;&#10;Opis wygenerowany automatycznie">
+            <a:extLst>
+              <a:ext uri="{FF2B5EF4-FFF2-40B4-BE49-F238E27FC236}">
+                <a16:creationId xmlns:a16="http://schemas.microsoft.com/office/drawing/2014/main" id="{F084A563-C0F8-E281-D37D-B81227277A67}"/>
+              </a:ext>
+            </a:extLst>
+          </p:cNvPr>
+          <p:cNvPicPr>
+            <a:picLocks noChangeAspect="1"/>
+          </p:cNvPicPr>
+          <p:nvPr/>
+        </p:nvPicPr>
+        <p:blipFill>
+          <a:blip r:embed="rId3">
+            <a:extLst>
+              <a:ext uri="{28A0092B-C50C-407E-A947-70E740481C1C}">
+                <a14:useLocalDpi xmlns:a14="http://schemas.microsoft.com/office/drawing/2010/main" val="0"/>
+              </a:ext>
+            </a:extLst>
+          </a:blip>
+          <a:stretch>
+            <a:fillRect/>
+          </a:stretch>
+        </p:blipFill>
+        <p:spPr>
+          <a:xfrm>
+            <a:off x="9693107" y="5888231"/>
+            <a:ext cx="2498893" cy="969769"/>
+          </a:xfrm>
+          <a:prstGeom prst="rect">
+            <a:avLst/>
+          </a:prstGeom>
+        </p:spPr>
+      </p:pic>
+      <p:sp>
+        <p:nvSpPr>
+          <p:cNvPr id="6" name="TextBox 5">
+            <a:extLst>
+              <a:ext uri="{FF2B5EF4-FFF2-40B4-BE49-F238E27FC236}">
+                <a16:creationId xmlns:a16="http://schemas.microsoft.com/office/drawing/2014/main" id="{E4CC6ABC-A85E-FC35-FCD6-923682DE6680}"/>
+              </a:ext>
+            </a:extLst>
+          </p:cNvPr>
+          <p:cNvSpPr txBox="1"/>
+          <p:nvPr/>
+        </p:nvSpPr>
+        <p:spPr>
+          <a:xfrm>
+            <a:off x="511727" y="6581001"/>
+            <a:ext cx="6375633" cy="276999"/>
+          </a:xfrm>
+          <a:prstGeom prst="rect">
+            <a:avLst/>
+          </a:prstGeom>
+          <a:noFill/>
+        </p:spPr>
+        <p:txBody>
+          <a:bodyPr wrap="square">
+            <a:spAutoFit/>
+          </a:bodyPr>
+          <a:lstStyle/>
+          <a:p>
+            <a:r>
+              <a:rPr lang="pl-PL" sz="1200" dirty="0">
+                <a:solidFill>
+                  <a:schemeClr val="bg2">
+                    <a:lumMod val="75000"/>
+                  </a:schemeClr>
+                </a:solidFill>
+              </a:rPr>
+              <a:t>Zaawansowane techniki programowania / Konrad Stępniak</a:t>
+            </a:r>
+          </a:p>
+        </p:txBody>
+      </p:sp>
     </p:spTree>
     <p:extLst>
       <p:ext uri="{BB962C8B-B14F-4D97-AF65-F5344CB8AC3E}">
@@ -10504,6 +10658,83 @@
               <a:buNone/>
             </a:pPr>
             <a:endParaRPr lang="pl-PL" dirty="0"/>
+          </a:p>
+        </p:txBody>
+      </p:sp>
+      <p:pic>
+        <p:nvPicPr>
+          <p:cNvPr id="4" name="Obraz 4" descr="Obraz zawierający tekst&#10;&#10;Opis wygenerowany automatycznie">
+            <a:extLst>
+              <a:ext uri="{FF2B5EF4-FFF2-40B4-BE49-F238E27FC236}">
+                <a16:creationId xmlns:a16="http://schemas.microsoft.com/office/drawing/2014/main" id="{70A6BACE-83A8-1EDB-7F10-950684806E70}"/>
+              </a:ext>
+            </a:extLst>
+          </p:cNvPr>
+          <p:cNvPicPr>
+            <a:picLocks noChangeAspect="1"/>
+          </p:cNvPicPr>
+          <p:nvPr/>
+        </p:nvPicPr>
+        <p:blipFill>
+          <a:blip r:embed="rId2">
+            <a:extLst>
+              <a:ext uri="{28A0092B-C50C-407E-A947-70E740481C1C}">
+                <a14:useLocalDpi xmlns:a14="http://schemas.microsoft.com/office/drawing/2010/main" val="0"/>
+              </a:ext>
+            </a:extLst>
+          </a:blip>
+          <a:stretch>
+            <a:fillRect/>
+          </a:stretch>
+        </p:blipFill>
+        <p:spPr>
+          <a:xfrm>
+            <a:off x="9693107" y="5888231"/>
+            <a:ext cx="2498893" cy="969769"/>
+          </a:xfrm>
+          <a:prstGeom prst="rect">
+            <a:avLst/>
+          </a:prstGeom>
+        </p:spPr>
+      </p:pic>
+      <p:sp>
+        <p:nvSpPr>
+          <p:cNvPr id="5" name="TextBox 4">
+            <a:extLst>
+              <a:ext uri="{FF2B5EF4-FFF2-40B4-BE49-F238E27FC236}">
+                <a16:creationId xmlns:a16="http://schemas.microsoft.com/office/drawing/2014/main" id="{EC30F048-5D54-186A-F7D7-EFA653D9E42C}"/>
+              </a:ext>
+            </a:extLst>
+          </p:cNvPr>
+          <p:cNvSpPr txBox="1"/>
+          <p:nvPr/>
+        </p:nvSpPr>
+        <p:spPr>
+          <a:xfrm>
+            <a:off x="469782" y="6581001"/>
+            <a:ext cx="6375633" cy="276999"/>
+          </a:xfrm>
+          <a:prstGeom prst="rect">
+            <a:avLst/>
+          </a:prstGeom>
+          <a:noFill/>
+        </p:spPr>
+        <p:txBody>
+          <a:bodyPr wrap="square">
+            <a:spAutoFit/>
+          </a:bodyPr>
+          <a:lstStyle/>
+          <a:p>
+            <a:r>
+              <a:rPr lang="pl-PL" sz="1200" dirty="0">
+                <a:solidFill>
+                  <a:schemeClr val="bg2">
+                    <a:lumMod val="75000"/>
+                  </a:schemeClr>
+                </a:solidFill>
+              </a:rPr>
+              <a:t>Zaawansowane techniki programowania / Konrad Stępniak</a:t>
+            </a:r>
           </a:p>
         </p:txBody>
       </p:sp>
@@ -10728,6 +10959,95 @@
           </a:prstGeom>
         </p:spPr>
       </p:pic>
+      <p:pic>
+        <p:nvPicPr>
+          <p:cNvPr id="3" name="Obraz 4" descr="Obraz zawierający tekst&#10;&#10;Opis wygenerowany automatycznie">
+            <a:extLst>
+              <a:ext uri="{FF2B5EF4-FFF2-40B4-BE49-F238E27FC236}">
+                <a16:creationId xmlns:a16="http://schemas.microsoft.com/office/drawing/2014/main" id="{24B5D50F-5CC5-D734-EA73-547C2E1167A6}"/>
+              </a:ext>
+            </a:extLst>
+          </p:cNvPr>
+          <p:cNvPicPr>
+            <a:picLocks noChangeAspect="1"/>
+          </p:cNvPicPr>
+          <p:nvPr/>
+        </p:nvPicPr>
+        <p:blipFill>
+          <a:blip r:embed="rId3">
+            <a:extLst>
+              <a:ext uri="{28A0092B-C50C-407E-A947-70E740481C1C}">
+                <a14:useLocalDpi xmlns:a14="http://schemas.microsoft.com/office/drawing/2010/main" val="0"/>
+              </a:ext>
+            </a:extLst>
+          </a:blip>
+          <a:stretch>
+            <a:fillRect/>
+          </a:stretch>
+        </p:blipFill>
+        <p:spPr>
+          <a:xfrm>
+            <a:off x="9693107" y="0"/>
+            <a:ext cx="2498893" cy="969769"/>
+          </a:xfrm>
+          <a:prstGeom prst="rect">
+            <a:avLst/>
+          </a:prstGeom>
+        </p:spPr>
+      </p:pic>
+      <p:sp>
+        <p:nvSpPr>
+          <p:cNvPr id="4" name="TextBox 3">
+            <a:extLst>
+              <a:ext uri="{FF2B5EF4-FFF2-40B4-BE49-F238E27FC236}">
+                <a16:creationId xmlns:a16="http://schemas.microsoft.com/office/drawing/2014/main" id="{59CE14DB-C35B-6B83-00D9-5A7AFC0142A7}"/>
+              </a:ext>
+            </a:extLst>
+          </p:cNvPr>
+          <p:cNvSpPr txBox="1"/>
+          <p:nvPr/>
+        </p:nvSpPr>
+        <p:spPr>
+          <a:xfrm>
+            <a:off x="5661049" y="6396335"/>
+            <a:ext cx="6375633" cy="461665"/>
+          </a:xfrm>
+          <a:prstGeom prst="rect">
+            <a:avLst/>
+          </a:prstGeom>
+          <a:noFill/>
+        </p:spPr>
+        <p:txBody>
+          <a:bodyPr wrap="square">
+            <a:spAutoFit/>
+          </a:bodyPr>
+          <a:lstStyle/>
+          <a:p>
+            <a:r>
+              <a:rPr lang="pl-PL" sz="1200" dirty="0">
+                <a:solidFill>
+                  <a:schemeClr val="bg2">
+                    <a:lumMod val="75000"/>
+                  </a:schemeClr>
+                </a:solidFill>
+              </a:rPr>
+              <a:t>Zaawansowane techniki programowania /</a:t>
+            </a:r>
+          </a:p>
+          <a:p>
+            <a:r>
+              <a:rPr lang="pl-PL" sz="1200" dirty="0">
+                <a:solidFill>
+                  <a:schemeClr val="bg2">
+                    <a:lumMod val="75000"/>
+                  </a:schemeClr>
+                </a:solidFill>
+              </a:rPr>
+              <a:t> Konrad Stępniak</a:t>
+            </a:r>
+          </a:p>
+        </p:txBody>
+      </p:sp>
     </p:spTree>
     <p:extLst>
       <p:ext uri="{BB962C8B-B14F-4D97-AF65-F5344CB8AC3E}">
@@ -10859,6 +11179,83 @@
           </a:p>
         </p:txBody>
       </p:sp>
+      <p:pic>
+        <p:nvPicPr>
+          <p:cNvPr id="4" name="Obraz 4" descr="Obraz zawierający tekst&#10;&#10;Opis wygenerowany automatycznie">
+            <a:extLst>
+              <a:ext uri="{FF2B5EF4-FFF2-40B4-BE49-F238E27FC236}">
+                <a16:creationId xmlns:a16="http://schemas.microsoft.com/office/drawing/2014/main" id="{7433A67C-BE66-08F5-5AF5-3C32E0499D22}"/>
+              </a:ext>
+            </a:extLst>
+          </p:cNvPr>
+          <p:cNvPicPr>
+            <a:picLocks noChangeAspect="1"/>
+          </p:cNvPicPr>
+          <p:nvPr/>
+        </p:nvPicPr>
+        <p:blipFill>
+          <a:blip r:embed="rId2">
+            <a:extLst>
+              <a:ext uri="{28A0092B-C50C-407E-A947-70E740481C1C}">
+                <a14:useLocalDpi xmlns:a14="http://schemas.microsoft.com/office/drawing/2010/main" val="0"/>
+              </a:ext>
+            </a:extLst>
+          </a:blip>
+          <a:stretch>
+            <a:fillRect/>
+          </a:stretch>
+        </p:blipFill>
+        <p:spPr>
+          <a:xfrm>
+            <a:off x="9693107" y="5888231"/>
+            <a:ext cx="2498893" cy="969769"/>
+          </a:xfrm>
+          <a:prstGeom prst="rect">
+            <a:avLst/>
+          </a:prstGeom>
+        </p:spPr>
+      </p:pic>
+      <p:sp>
+        <p:nvSpPr>
+          <p:cNvPr id="5" name="TextBox 4">
+            <a:extLst>
+              <a:ext uri="{FF2B5EF4-FFF2-40B4-BE49-F238E27FC236}">
+                <a16:creationId xmlns:a16="http://schemas.microsoft.com/office/drawing/2014/main" id="{FDC4ED4F-61FC-84DF-EE0A-F13D86215803}"/>
+              </a:ext>
+            </a:extLst>
+          </p:cNvPr>
+          <p:cNvSpPr txBox="1"/>
+          <p:nvPr/>
+        </p:nvSpPr>
+        <p:spPr>
+          <a:xfrm>
+            <a:off x="494949" y="6581001"/>
+            <a:ext cx="6375633" cy="276999"/>
+          </a:xfrm>
+          <a:prstGeom prst="rect">
+            <a:avLst/>
+          </a:prstGeom>
+          <a:noFill/>
+        </p:spPr>
+        <p:txBody>
+          <a:bodyPr wrap="square">
+            <a:spAutoFit/>
+          </a:bodyPr>
+          <a:lstStyle/>
+          <a:p>
+            <a:r>
+              <a:rPr lang="pl-PL" sz="1200" dirty="0">
+                <a:solidFill>
+                  <a:schemeClr val="bg2">
+                    <a:lumMod val="75000"/>
+                  </a:schemeClr>
+                </a:solidFill>
+              </a:rPr>
+              <a:t>Zaawansowane techniki programowania / Konrad Stępniak</a:t>
+            </a:r>
+          </a:p>
+        </p:txBody>
+      </p:sp>
     </p:spTree>
     <p:extLst>
       <p:ext uri="{BB962C8B-B14F-4D97-AF65-F5344CB8AC3E}">
@@ -11039,6 +11436,83 @@
           </a:p>
           <a:p>
             <a:endParaRPr lang="pl-PL" dirty="0"/>
+          </a:p>
+        </p:txBody>
+      </p:sp>
+      <p:pic>
+        <p:nvPicPr>
+          <p:cNvPr id="4" name="Obraz 4" descr="Obraz zawierający tekst&#10;&#10;Opis wygenerowany automatycznie">
+            <a:extLst>
+              <a:ext uri="{FF2B5EF4-FFF2-40B4-BE49-F238E27FC236}">
+                <a16:creationId xmlns:a16="http://schemas.microsoft.com/office/drawing/2014/main" id="{8A7E2667-24E1-7C37-AB23-AE1015ECF9F0}"/>
+              </a:ext>
+            </a:extLst>
+          </p:cNvPr>
+          <p:cNvPicPr>
+            <a:picLocks noChangeAspect="1"/>
+          </p:cNvPicPr>
+          <p:nvPr/>
+        </p:nvPicPr>
+        <p:blipFill>
+          <a:blip r:embed="rId2">
+            <a:extLst>
+              <a:ext uri="{28A0092B-C50C-407E-A947-70E740481C1C}">
+                <a14:useLocalDpi xmlns:a14="http://schemas.microsoft.com/office/drawing/2010/main" val="0"/>
+              </a:ext>
+            </a:extLst>
+          </a:blip>
+          <a:stretch>
+            <a:fillRect/>
+          </a:stretch>
+        </p:blipFill>
+        <p:spPr>
+          <a:xfrm>
+            <a:off x="9693107" y="5888231"/>
+            <a:ext cx="2498893" cy="969769"/>
+          </a:xfrm>
+          <a:prstGeom prst="rect">
+            <a:avLst/>
+          </a:prstGeom>
+        </p:spPr>
+      </p:pic>
+      <p:sp>
+        <p:nvSpPr>
+          <p:cNvPr id="5" name="TextBox 4">
+            <a:extLst>
+              <a:ext uri="{FF2B5EF4-FFF2-40B4-BE49-F238E27FC236}">
+                <a16:creationId xmlns:a16="http://schemas.microsoft.com/office/drawing/2014/main" id="{B5E9901F-9C19-4F32-6048-A167F925C600}"/>
+              </a:ext>
+            </a:extLst>
+          </p:cNvPr>
+          <p:cNvSpPr txBox="1"/>
+          <p:nvPr/>
+        </p:nvSpPr>
+        <p:spPr>
+          <a:xfrm>
+            <a:off x="511727" y="6581001"/>
+            <a:ext cx="6375633" cy="276999"/>
+          </a:xfrm>
+          <a:prstGeom prst="rect">
+            <a:avLst/>
+          </a:prstGeom>
+          <a:noFill/>
+        </p:spPr>
+        <p:txBody>
+          <a:bodyPr wrap="square">
+            <a:spAutoFit/>
+          </a:bodyPr>
+          <a:lstStyle/>
+          <a:p>
+            <a:r>
+              <a:rPr lang="pl-PL" sz="1200" dirty="0">
+                <a:solidFill>
+                  <a:schemeClr val="bg2">
+                    <a:lumMod val="75000"/>
+                  </a:schemeClr>
+                </a:solidFill>
+              </a:rPr>
+              <a:t>Zaawansowane techniki programowania / Konrad Stępniak</a:t>
+            </a:r>
           </a:p>
         </p:txBody>
       </p:sp>
@@ -11334,6 +11808,83 @@
           </a:p>
         </p:txBody>
       </p:sp>
+      <p:pic>
+        <p:nvPicPr>
+          <p:cNvPr id="3" name="Obraz 4" descr="Obraz zawierający tekst&#10;&#10;Opis wygenerowany automatycznie">
+            <a:extLst>
+              <a:ext uri="{FF2B5EF4-FFF2-40B4-BE49-F238E27FC236}">
+                <a16:creationId xmlns:a16="http://schemas.microsoft.com/office/drawing/2014/main" id="{275C0F9A-E80A-9867-2AC9-85F50F3F4985}"/>
+              </a:ext>
+            </a:extLst>
+          </p:cNvPr>
+          <p:cNvPicPr>
+            <a:picLocks noChangeAspect="1"/>
+          </p:cNvPicPr>
+          <p:nvPr/>
+        </p:nvPicPr>
+        <p:blipFill>
+          <a:blip r:embed="rId2">
+            <a:extLst>
+              <a:ext uri="{28A0092B-C50C-407E-A947-70E740481C1C}">
+                <a14:useLocalDpi xmlns:a14="http://schemas.microsoft.com/office/drawing/2010/main" val="0"/>
+              </a:ext>
+            </a:extLst>
+          </a:blip>
+          <a:stretch>
+            <a:fillRect/>
+          </a:stretch>
+        </p:blipFill>
+        <p:spPr>
+          <a:xfrm>
+            <a:off x="9468740" y="5965932"/>
+            <a:ext cx="2498893" cy="969769"/>
+          </a:xfrm>
+          <a:prstGeom prst="rect">
+            <a:avLst/>
+          </a:prstGeom>
+        </p:spPr>
+      </p:pic>
+      <p:sp>
+        <p:nvSpPr>
+          <p:cNvPr id="6" name="TextBox 5">
+            <a:extLst>
+              <a:ext uri="{FF2B5EF4-FFF2-40B4-BE49-F238E27FC236}">
+                <a16:creationId xmlns:a16="http://schemas.microsoft.com/office/drawing/2014/main" id="{34214990-967B-0812-65E8-CD9DB5E9DA36}"/>
+              </a:ext>
+            </a:extLst>
+          </p:cNvPr>
+          <p:cNvSpPr txBox="1"/>
+          <p:nvPr/>
+        </p:nvSpPr>
+        <p:spPr>
+          <a:xfrm>
+            <a:off x="-1" y="6581001"/>
+            <a:ext cx="6375633" cy="276999"/>
+          </a:xfrm>
+          <a:prstGeom prst="rect">
+            <a:avLst/>
+          </a:prstGeom>
+          <a:noFill/>
+        </p:spPr>
+        <p:txBody>
+          <a:bodyPr wrap="square">
+            <a:spAutoFit/>
+          </a:bodyPr>
+          <a:lstStyle/>
+          <a:p>
+            <a:r>
+              <a:rPr lang="pl-PL" sz="1200" dirty="0">
+                <a:solidFill>
+                  <a:schemeClr val="bg2">
+                    <a:lumMod val="75000"/>
+                  </a:schemeClr>
+                </a:solidFill>
+              </a:rPr>
+              <a:t>Zaawansowane techniki programowania / Konrad Stępniak</a:t>
+            </a:r>
+          </a:p>
+        </p:txBody>
+      </p:sp>
     </p:spTree>
     <p:extLst>
       <p:ext uri="{BB962C8B-B14F-4D97-AF65-F5344CB8AC3E}">
@@ -11712,6 +12263,83 @@
             <a:schemeClr val="lt1"/>
           </a:fontRef>
         </p:style>
+      </p:sp>
+      <p:pic>
+        <p:nvPicPr>
+          <p:cNvPr id="10" name="Obraz 4" descr="Obraz zawierający tekst&#10;&#10;Opis wygenerowany automatycznie">
+            <a:extLst>
+              <a:ext uri="{FF2B5EF4-FFF2-40B4-BE49-F238E27FC236}">
+                <a16:creationId xmlns:a16="http://schemas.microsoft.com/office/drawing/2014/main" id="{86F2AE0A-C518-6DA6-01FF-B0182EEEF82D}"/>
+              </a:ext>
+            </a:extLst>
+          </p:cNvPr>
+          <p:cNvPicPr>
+            <a:picLocks noChangeAspect="1"/>
+          </p:cNvPicPr>
+          <p:nvPr/>
+        </p:nvPicPr>
+        <p:blipFill>
+          <a:blip r:embed="rId2">
+            <a:extLst>
+              <a:ext uri="{28A0092B-C50C-407E-A947-70E740481C1C}">
+                <a14:useLocalDpi xmlns:a14="http://schemas.microsoft.com/office/drawing/2010/main" val="0"/>
+              </a:ext>
+            </a:extLst>
+          </a:blip>
+          <a:stretch>
+            <a:fillRect/>
+          </a:stretch>
+        </p:blipFill>
+        <p:spPr>
+          <a:xfrm>
+            <a:off x="9693107" y="5888231"/>
+            <a:ext cx="2498893" cy="969769"/>
+          </a:xfrm>
+          <a:prstGeom prst="rect">
+            <a:avLst/>
+          </a:prstGeom>
+        </p:spPr>
+      </p:pic>
+      <p:sp>
+        <p:nvSpPr>
+          <p:cNvPr id="13" name="TextBox 12">
+            <a:extLst>
+              <a:ext uri="{FF2B5EF4-FFF2-40B4-BE49-F238E27FC236}">
+                <a16:creationId xmlns:a16="http://schemas.microsoft.com/office/drawing/2014/main" id="{25CA0A71-E3CC-3FF1-003B-608AC773336F}"/>
+              </a:ext>
+            </a:extLst>
+          </p:cNvPr>
+          <p:cNvSpPr txBox="1"/>
+          <p:nvPr/>
+        </p:nvSpPr>
+        <p:spPr>
+          <a:xfrm>
+            <a:off x="448733" y="6581001"/>
+            <a:ext cx="6375633" cy="276999"/>
+          </a:xfrm>
+          <a:prstGeom prst="rect">
+            <a:avLst/>
+          </a:prstGeom>
+          <a:noFill/>
+        </p:spPr>
+        <p:txBody>
+          <a:bodyPr wrap="square">
+            <a:spAutoFit/>
+          </a:bodyPr>
+          <a:lstStyle/>
+          <a:p>
+            <a:r>
+              <a:rPr lang="pl-PL" sz="1200" dirty="0">
+                <a:solidFill>
+                  <a:schemeClr val="bg2">
+                    <a:lumMod val="75000"/>
+                  </a:schemeClr>
+                </a:solidFill>
+              </a:rPr>
+              <a:t>Zaawansowane techniki programowania / Konrad Stępniak</a:t>
+            </a:r>
+          </a:p>
+        </p:txBody>
       </p:sp>
     </p:spTree>
     <p:extLst>
@@ -13406,6 +14034,83 @@
           </a:p>
         </p:txBody>
       </p:sp>
+      <p:pic>
+        <p:nvPicPr>
+          <p:cNvPr id="4" name="Obraz 4" descr="Obraz zawierający tekst&#10;&#10;Opis wygenerowany automatycznie">
+            <a:extLst>
+              <a:ext uri="{FF2B5EF4-FFF2-40B4-BE49-F238E27FC236}">
+                <a16:creationId xmlns:a16="http://schemas.microsoft.com/office/drawing/2014/main" id="{275C0F9A-E80A-9867-2AC9-85F50F3F4985}"/>
+              </a:ext>
+            </a:extLst>
+          </p:cNvPr>
+          <p:cNvPicPr>
+            <a:picLocks noChangeAspect="1"/>
+          </p:cNvPicPr>
+          <p:nvPr/>
+        </p:nvPicPr>
+        <p:blipFill>
+          <a:blip r:embed="rId3">
+            <a:extLst>
+              <a:ext uri="{28A0092B-C50C-407E-A947-70E740481C1C}">
+                <a14:useLocalDpi xmlns:a14="http://schemas.microsoft.com/office/drawing/2010/main" val="0"/>
+              </a:ext>
+            </a:extLst>
+          </a:blip>
+          <a:stretch>
+            <a:fillRect/>
+          </a:stretch>
+        </p:blipFill>
+        <p:spPr>
+          <a:xfrm>
+            <a:off x="10023820" y="6009759"/>
+            <a:ext cx="2218468" cy="860942"/>
+          </a:xfrm>
+          <a:prstGeom prst="rect">
+            <a:avLst/>
+          </a:prstGeom>
+        </p:spPr>
+      </p:pic>
+      <p:sp>
+        <p:nvSpPr>
+          <p:cNvPr id="6" name="TextBox 5">
+            <a:extLst>
+              <a:ext uri="{FF2B5EF4-FFF2-40B4-BE49-F238E27FC236}">
+                <a16:creationId xmlns:a16="http://schemas.microsoft.com/office/drawing/2014/main" id="{D0BB744A-7C24-2E52-F46A-56AEF15A0269}"/>
+              </a:ext>
+            </a:extLst>
+          </p:cNvPr>
+          <p:cNvSpPr txBox="1"/>
+          <p:nvPr/>
+        </p:nvSpPr>
+        <p:spPr>
+          <a:xfrm>
+            <a:off x="421298" y="6589468"/>
+            <a:ext cx="6375633" cy="276999"/>
+          </a:xfrm>
+          <a:prstGeom prst="rect">
+            <a:avLst/>
+          </a:prstGeom>
+          <a:noFill/>
+        </p:spPr>
+        <p:txBody>
+          <a:bodyPr wrap="square">
+            <a:spAutoFit/>
+          </a:bodyPr>
+          <a:lstStyle/>
+          <a:p>
+            <a:r>
+              <a:rPr lang="pl-PL" sz="1200" dirty="0">
+                <a:solidFill>
+                  <a:schemeClr val="bg2">
+                    <a:lumMod val="75000"/>
+                  </a:schemeClr>
+                </a:solidFill>
+              </a:rPr>
+              <a:t>Zaawansowane techniki programowania / Konrad Stępniak</a:t>
+            </a:r>
+          </a:p>
+        </p:txBody>
+      </p:sp>
     </p:spTree>
     <p:extLst>
       <p:ext uri="{BB962C8B-B14F-4D97-AF65-F5344CB8AC3E}">
@@ -14307,6 +15012,95 @@
           </a:p>
         </p:txBody>
       </p:sp>
+      <p:pic>
+        <p:nvPicPr>
+          <p:cNvPr id="3" name="Obraz 4" descr="Obraz zawierający tekst&#10;&#10;Opis wygenerowany automatycznie">
+            <a:extLst>
+              <a:ext uri="{FF2B5EF4-FFF2-40B4-BE49-F238E27FC236}">
+                <a16:creationId xmlns:a16="http://schemas.microsoft.com/office/drawing/2014/main" id="{6028DF41-D07E-C5D8-9382-28054B53853B}"/>
+              </a:ext>
+            </a:extLst>
+          </p:cNvPr>
+          <p:cNvPicPr>
+            <a:picLocks noChangeAspect="1"/>
+          </p:cNvPicPr>
+          <p:nvPr/>
+        </p:nvPicPr>
+        <p:blipFill>
+          <a:blip r:embed="rId7">
+            <a:extLst>
+              <a:ext uri="{28A0092B-C50C-407E-A947-70E740481C1C}">
+                <a14:useLocalDpi xmlns:a14="http://schemas.microsoft.com/office/drawing/2010/main" val="0"/>
+              </a:ext>
+            </a:extLst>
+          </a:blip>
+          <a:stretch>
+            <a:fillRect/>
+          </a:stretch>
+        </p:blipFill>
+        <p:spPr>
+          <a:xfrm>
+            <a:off x="-40033" y="5896698"/>
+            <a:ext cx="2498893" cy="969769"/>
+          </a:xfrm>
+          <a:prstGeom prst="rect">
+            <a:avLst/>
+          </a:prstGeom>
+        </p:spPr>
+      </p:pic>
+      <p:sp>
+        <p:nvSpPr>
+          <p:cNvPr id="4" name="TextBox 3">
+            <a:extLst>
+              <a:ext uri="{FF2B5EF4-FFF2-40B4-BE49-F238E27FC236}">
+                <a16:creationId xmlns:a16="http://schemas.microsoft.com/office/drawing/2014/main" id="{39545DBD-E740-B639-1912-3B3CA61F2CCD}"/>
+              </a:ext>
+            </a:extLst>
+          </p:cNvPr>
+          <p:cNvSpPr txBox="1"/>
+          <p:nvPr/>
+        </p:nvSpPr>
+        <p:spPr>
+          <a:xfrm>
+            <a:off x="0" y="0"/>
+            <a:ext cx="6375633" cy="461665"/>
+          </a:xfrm>
+          <a:prstGeom prst="rect">
+            <a:avLst/>
+          </a:prstGeom>
+          <a:noFill/>
+        </p:spPr>
+        <p:txBody>
+          <a:bodyPr wrap="square">
+            <a:spAutoFit/>
+          </a:bodyPr>
+          <a:lstStyle/>
+          <a:p>
+            <a:r>
+              <a:rPr lang="pl-PL" sz="1200" dirty="0">
+                <a:solidFill>
+                  <a:schemeClr val="bg2">
+                    <a:lumMod val="75000"/>
+                  </a:schemeClr>
+                </a:solidFill>
+              </a:rPr>
+              <a:t>Zaawansowane techniki programowania / </a:t>
+            </a:r>
+          </a:p>
+          <a:p>
+            <a:r>
+              <a:rPr lang="pl-PL" sz="1200" dirty="0">
+                <a:solidFill>
+                  <a:schemeClr val="bg2">
+                    <a:lumMod val="75000"/>
+                  </a:schemeClr>
+                </a:solidFill>
+              </a:rPr>
+              <a:t>Konrad Stępniak</a:t>
+            </a:r>
+          </a:p>
+        </p:txBody>
+      </p:sp>
     </p:spTree>
     <p:extLst>
       <p:ext uri="{BB962C8B-B14F-4D97-AF65-F5344CB8AC3E}">
@@ -14451,6 +15245,83 @@
           </a:prstGeom>
         </p:spPr>
       </p:pic>
+      <p:pic>
+        <p:nvPicPr>
+          <p:cNvPr id="3" name="Obraz 4" descr="Obraz zawierający tekst&#10;&#10;Opis wygenerowany automatycznie">
+            <a:extLst>
+              <a:ext uri="{FF2B5EF4-FFF2-40B4-BE49-F238E27FC236}">
+                <a16:creationId xmlns:a16="http://schemas.microsoft.com/office/drawing/2014/main" id="{241CF298-7FF0-0DA0-D477-42A49EC7A4A8}"/>
+              </a:ext>
+            </a:extLst>
+          </p:cNvPr>
+          <p:cNvPicPr>
+            <a:picLocks noChangeAspect="1"/>
+          </p:cNvPicPr>
+          <p:nvPr/>
+        </p:nvPicPr>
+        <p:blipFill>
+          <a:blip r:embed="rId3">
+            <a:extLst>
+              <a:ext uri="{28A0092B-C50C-407E-A947-70E740481C1C}">
+                <a14:useLocalDpi xmlns:a14="http://schemas.microsoft.com/office/drawing/2010/main" val="0"/>
+              </a:ext>
+            </a:extLst>
+          </a:blip>
+          <a:stretch>
+            <a:fillRect/>
+          </a:stretch>
+        </p:blipFill>
+        <p:spPr>
+          <a:xfrm>
+            <a:off x="9693107" y="5888231"/>
+            <a:ext cx="2498893" cy="969769"/>
+          </a:xfrm>
+          <a:prstGeom prst="rect">
+            <a:avLst/>
+          </a:prstGeom>
+        </p:spPr>
+      </p:pic>
+      <p:sp>
+        <p:nvSpPr>
+          <p:cNvPr id="4" name="TextBox 3">
+            <a:extLst>
+              <a:ext uri="{FF2B5EF4-FFF2-40B4-BE49-F238E27FC236}">
+                <a16:creationId xmlns:a16="http://schemas.microsoft.com/office/drawing/2014/main" id="{0991F424-6DEA-CC02-700A-2124C8ADD942}"/>
+              </a:ext>
+            </a:extLst>
+          </p:cNvPr>
+          <p:cNvSpPr txBox="1"/>
+          <p:nvPr/>
+        </p:nvSpPr>
+        <p:spPr>
+          <a:xfrm>
+            <a:off x="424231" y="6581001"/>
+            <a:ext cx="6375633" cy="276999"/>
+          </a:xfrm>
+          <a:prstGeom prst="rect">
+            <a:avLst/>
+          </a:prstGeom>
+          <a:noFill/>
+        </p:spPr>
+        <p:txBody>
+          <a:bodyPr wrap="square">
+            <a:spAutoFit/>
+          </a:bodyPr>
+          <a:lstStyle/>
+          <a:p>
+            <a:r>
+              <a:rPr lang="pl-PL" sz="1200" dirty="0">
+                <a:solidFill>
+                  <a:schemeClr val="bg2">
+                    <a:lumMod val="75000"/>
+                  </a:schemeClr>
+                </a:solidFill>
+              </a:rPr>
+              <a:t>Zaawansowane techniki programowania / Konrad Stępniak</a:t>
+            </a:r>
+          </a:p>
+        </p:txBody>
+      </p:sp>
     </p:spTree>
     <p:extLst>
       <p:ext uri="{BB962C8B-B14F-4D97-AF65-F5344CB8AC3E}">
@@ -14653,6 +15524,83 @@
                 <a:latin typeface="Söhne"/>
               </a:rPr>
               <a:t>W naszym przykładzie, jeśli metoda isInRange zwróci false, wówczas asercja assertTrue rzuci wyjątek, który zostanie zinterpretowany jako błąd przez IDE i pokaże błąd działania testowanego kodu.</a:t>
+            </a:r>
+          </a:p>
+        </p:txBody>
+      </p:sp>
+      <p:pic>
+        <p:nvPicPr>
+          <p:cNvPr id="3" name="Obraz 4" descr="Obraz zawierający tekst&#10;&#10;Opis wygenerowany automatycznie">
+            <a:extLst>
+              <a:ext uri="{FF2B5EF4-FFF2-40B4-BE49-F238E27FC236}">
+                <a16:creationId xmlns:a16="http://schemas.microsoft.com/office/drawing/2014/main" id="{FF347C57-02A0-92F7-47F3-13D6F406C13C}"/>
+              </a:ext>
+            </a:extLst>
+          </p:cNvPr>
+          <p:cNvPicPr>
+            <a:picLocks noChangeAspect="1"/>
+          </p:cNvPicPr>
+          <p:nvPr/>
+        </p:nvPicPr>
+        <p:blipFill>
+          <a:blip r:embed="rId3">
+            <a:extLst>
+              <a:ext uri="{28A0092B-C50C-407E-A947-70E740481C1C}">
+                <a14:useLocalDpi xmlns:a14="http://schemas.microsoft.com/office/drawing/2010/main" val="0"/>
+              </a:ext>
+            </a:extLst>
+          </a:blip>
+          <a:stretch>
+            <a:fillRect/>
+          </a:stretch>
+        </p:blipFill>
+        <p:spPr>
+          <a:xfrm>
+            <a:off x="9693107" y="5888231"/>
+            <a:ext cx="2498893" cy="969769"/>
+          </a:xfrm>
+          <a:prstGeom prst="rect">
+            <a:avLst/>
+          </a:prstGeom>
+        </p:spPr>
+      </p:pic>
+      <p:sp>
+        <p:nvSpPr>
+          <p:cNvPr id="4" name="TextBox 3">
+            <a:extLst>
+              <a:ext uri="{FF2B5EF4-FFF2-40B4-BE49-F238E27FC236}">
+                <a16:creationId xmlns:a16="http://schemas.microsoft.com/office/drawing/2014/main" id="{F1CD49B0-2EBA-08D9-9DB9-0BAF281F2E5A}"/>
+              </a:ext>
+            </a:extLst>
+          </p:cNvPr>
+          <p:cNvSpPr txBox="1"/>
+          <p:nvPr/>
+        </p:nvSpPr>
+        <p:spPr>
+          <a:xfrm>
+            <a:off x="478172" y="6581001"/>
+            <a:ext cx="6375633" cy="276999"/>
+          </a:xfrm>
+          <a:prstGeom prst="rect">
+            <a:avLst/>
+          </a:prstGeom>
+          <a:noFill/>
+        </p:spPr>
+        <p:txBody>
+          <a:bodyPr wrap="square">
+            <a:spAutoFit/>
+          </a:bodyPr>
+          <a:lstStyle/>
+          <a:p>
+            <a:r>
+              <a:rPr lang="pl-PL" sz="1200" dirty="0">
+                <a:solidFill>
+                  <a:schemeClr val="bg2">
+                    <a:lumMod val="75000"/>
+                  </a:schemeClr>
+                </a:solidFill>
+              </a:rPr>
+              <a:t>Zaawansowane techniki programowania / Konrad Stępniak</a:t>
             </a:r>
           </a:p>
         </p:txBody>
@@ -15502,6 +16450,83 @@
           </a:prstGeom>
         </p:spPr>
       </p:pic>
+      <p:pic>
+        <p:nvPicPr>
+          <p:cNvPr id="3" name="Obraz 4" descr="Obraz zawierający tekst&#10;&#10;Opis wygenerowany automatycznie">
+            <a:extLst>
+              <a:ext uri="{FF2B5EF4-FFF2-40B4-BE49-F238E27FC236}">
+                <a16:creationId xmlns:a16="http://schemas.microsoft.com/office/drawing/2014/main" id="{605CD442-C52C-4EF6-97A1-A116147F9F86}"/>
+              </a:ext>
+            </a:extLst>
+          </p:cNvPr>
+          <p:cNvPicPr>
+            <a:picLocks noChangeAspect="1"/>
+          </p:cNvPicPr>
+          <p:nvPr/>
+        </p:nvPicPr>
+        <p:blipFill>
+          <a:blip r:embed="rId3">
+            <a:extLst>
+              <a:ext uri="{28A0092B-C50C-407E-A947-70E740481C1C}">
+                <a14:useLocalDpi xmlns:a14="http://schemas.microsoft.com/office/drawing/2010/main" val="0"/>
+              </a:ext>
+            </a:extLst>
+          </a:blip>
+          <a:stretch>
+            <a:fillRect/>
+          </a:stretch>
+        </p:blipFill>
+        <p:spPr>
+          <a:xfrm>
+            <a:off x="9686378" y="5896698"/>
+            <a:ext cx="2498893" cy="969769"/>
+          </a:xfrm>
+          <a:prstGeom prst="rect">
+            <a:avLst/>
+          </a:prstGeom>
+        </p:spPr>
+      </p:pic>
+      <p:sp>
+        <p:nvSpPr>
+          <p:cNvPr id="4" name="TextBox 3">
+            <a:extLst>
+              <a:ext uri="{FF2B5EF4-FFF2-40B4-BE49-F238E27FC236}">
+                <a16:creationId xmlns:a16="http://schemas.microsoft.com/office/drawing/2014/main" id="{724EAD76-75D4-8D36-2CE0-9748AC015711}"/>
+              </a:ext>
+            </a:extLst>
+          </p:cNvPr>
+          <p:cNvSpPr txBox="1"/>
+          <p:nvPr/>
+        </p:nvSpPr>
+        <p:spPr>
+          <a:xfrm>
+            <a:off x="537397" y="6581001"/>
+            <a:ext cx="6375633" cy="276999"/>
+          </a:xfrm>
+          <a:prstGeom prst="rect">
+            <a:avLst/>
+          </a:prstGeom>
+          <a:noFill/>
+        </p:spPr>
+        <p:txBody>
+          <a:bodyPr wrap="square">
+            <a:spAutoFit/>
+          </a:bodyPr>
+          <a:lstStyle/>
+          <a:p>
+            <a:r>
+              <a:rPr lang="pl-PL" sz="1200" dirty="0">
+                <a:solidFill>
+                  <a:schemeClr val="bg2">
+                    <a:lumMod val="75000"/>
+                  </a:schemeClr>
+                </a:solidFill>
+              </a:rPr>
+              <a:t>Zaawansowane techniki programowania / Konrad Stępniak</a:t>
+            </a:r>
+          </a:p>
+        </p:txBody>
+      </p:sp>
     </p:spTree>
     <p:extLst>
       <p:ext uri="{BB962C8B-B14F-4D97-AF65-F5344CB8AC3E}">
@@ -15619,6 +16644,83 @@
             <a:r>
               <a:rPr lang="pl-PL" sz="2800" dirty="0"/>
               <a:t>Junit wykorzystuje adnotacje takie jak @Before lub @After, które możemy dodać do metody w klasie z testami. </a:t>
+            </a:r>
+          </a:p>
+        </p:txBody>
+      </p:sp>
+      <p:pic>
+        <p:nvPicPr>
+          <p:cNvPr id="4" name="Obraz 4" descr="Obraz zawierający tekst&#10;&#10;Opis wygenerowany automatycznie">
+            <a:extLst>
+              <a:ext uri="{FF2B5EF4-FFF2-40B4-BE49-F238E27FC236}">
+                <a16:creationId xmlns:a16="http://schemas.microsoft.com/office/drawing/2014/main" id="{AAA746D9-DE3A-B9A2-0188-EC326D444FAD}"/>
+              </a:ext>
+            </a:extLst>
+          </p:cNvPr>
+          <p:cNvPicPr>
+            <a:picLocks noChangeAspect="1"/>
+          </p:cNvPicPr>
+          <p:nvPr/>
+        </p:nvPicPr>
+        <p:blipFill>
+          <a:blip r:embed="rId2">
+            <a:extLst>
+              <a:ext uri="{28A0092B-C50C-407E-A947-70E740481C1C}">
+                <a14:useLocalDpi xmlns:a14="http://schemas.microsoft.com/office/drawing/2010/main" val="0"/>
+              </a:ext>
+            </a:extLst>
+          </a:blip>
+          <a:stretch>
+            <a:fillRect/>
+          </a:stretch>
+        </p:blipFill>
+        <p:spPr>
+          <a:xfrm>
+            <a:off x="9693107" y="5888231"/>
+            <a:ext cx="2498893" cy="969769"/>
+          </a:xfrm>
+          <a:prstGeom prst="rect">
+            <a:avLst/>
+          </a:prstGeom>
+        </p:spPr>
+      </p:pic>
+      <p:sp>
+        <p:nvSpPr>
+          <p:cNvPr id="5" name="TextBox 4">
+            <a:extLst>
+              <a:ext uri="{FF2B5EF4-FFF2-40B4-BE49-F238E27FC236}">
+                <a16:creationId xmlns:a16="http://schemas.microsoft.com/office/drawing/2014/main" id="{6C6A2812-F65A-1F65-C663-AF345DCB8699}"/>
+              </a:ext>
+            </a:extLst>
+          </p:cNvPr>
+          <p:cNvSpPr txBox="1"/>
+          <p:nvPr/>
+        </p:nvSpPr>
+        <p:spPr>
+          <a:xfrm>
+            <a:off x="536894" y="6581001"/>
+            <a:ext cx="6375633" cy="276999"/>
+          </a:xfrm>
+          <a:prstGeom prst="rect">
+            <a:avLst/>
+          </a:prstGeom>
+          <a:noFill/>
+        </p:spPr>
+        <p:txBody>
+          <a:bodyPr wrap="square">
+            <a:spAutoFit/>
+          </a:bodyPr>
+          <a:lstStyle/>
+          <a:p>
+            <a:r>
+              <a:rPr lang="pl-PL" sz="1200" dirty="0">
+                <a:solidFill>
+                  <a:schemeClr val="bg2">
+                    <a:lumMod val="75000"/>
+                  </a:schemeClr>
+                </a:solidFill>
+              </a:rPr>
+              <a:t>Zaawansowane techniki programowania / Konrad Stępniak</a:t>
             </a:r>
           </a:p>
         </p:txBody>

</xml_diff>